<commit_message>
Added page numbers to slides
</commit_message>
<xml_diff>
--- a/docs/Introduction to Raspberry Pi.pptx
+++ b/docs/Introduction to Raspberry Pi.pptx
@@ -1,9 +1,12 @@
 
 <file path=ppt/presentation.xml><?xml version="1.0" encoding="utf-8"?>
-<p:presentation xmlns:a="http://schemas.openxmlformats.org/drawingml/2006/main" xmlns:r="http://schemas.openxmlformats.org/officeDocument/2006/relationships" xmlns:p="http://schemas.openxmlformats.org/presentationml/2006/main" autoCompressPictures="0">
+<p:presentation xmlns:a="http://schemas.openxmlformats.org/drawingml/2006/main" xmlns:r="http://schemas.openxmlformats.org/officeDocument/2006/relationships" xmlns:p="http://schemas.openxmlformats.org/presentationml/2006/main" showSpecialPlsOnTitleSld="0" autoCompressPictures="0">
   <p:sldMasterIdLst>
     <p:sldMasterId id="2147483648" r:id="rId1"/>
   </p:sldMasterIdLst>
+  <p:notesMasterIdLst>
+    <p:notesMasterId r:id="rId9"/>
+  </p:notesMasterIdLst>
   <p:sldIdLst>
     <p:sldId id="256" r:id="rId2"/>
     <p:sldId id="258" r:id="rId3"/>
@@ -281,6 +284,355 @@
 </pc:chgInfo>
 </file>
 
+<file path=ppt/notesMasters/notesMaster1.xml><?xml version="1.0" encoding="utf-8"?>
+<p:notesMaster xmlns:a="http://schemas.openxmlformats.org/drawingml/2006/main" xmlns:r="http://schemas.openxmlformats.org/officeDocument/2006/relationships" xmlns:p="http://schemas.openxmlformats.org/presentationml/2006/main">
+  <p:cSld>
+    <p:bg>
+      <p:bgRef idx="1001">
+        <a:schemeClr val="bg1"/>
+      </p:bgRef>
+    </p:bg>
+    <p:spTree>
+      <p:nvGrpSpPr>
+        <p:cNvPr id="1" name=""/>
+        <p:cNvGrpSpPr/>
+        <p:nvPr/>
+      </p:nvGrpSpPr>
+      <p:grpSpPr>
+        <a:xfrm>
+          <a:off x="0" y="0"/>
+          <a:ext cx="0" cy="0"/>
+          <a:chOff x="0" y="0"/>
+          <a:chExt cx="0" cy="0"/>
+        </a:xfrm>
+      </p:grpSpPr>
+      <p:sp>
+        <p:nvSpPr>
+          <p:cNvPr id="2" name="Header Placeholder 1"/>
+          <p:cNvSpPr>
+            <a:spLocks noGrp="1"/>
+          </p:cNvSpPr>
+          <p:nvPr>
+            <p:ph type="hdr" sz="quarter"/>
+          </p:nvPr>
+        </p:nvSpPr>
+        <p:spPr>
+          <a:xfrm>
+            <a:off x="0" y="0"/>
+            <a:ext cx="3170238" cy="481013"/>
+          </a:xfrm>
+          <a:prstGeom prst="rect">
+            <a:avLst/>
+          </a:prstGeom>
+        </p:spPr>
+        <p:txBody>
+          <a:bodyPr vert="horz" lIns="91440" tIns="45720" rIns="91440" bIns="45720" rtlCol="0"/>
+          <a:lstStyle>
+            <a:lvl1pPr algn="l">
+              <a:defRPr sz="1200"/>
+            </a:lvl1pPr>
+          </a:lstStyle>
+          <a:p>
+            <a:endParaRPr lang="en-US"/>
+          </a:p>
+        </p:txBody>
+      </p:sp>
+      <p:sp>
+        <p:nvSpPr>
+          <p:cNvPr id="3" name="Date Placeholder 2"/>
+          <p:cNvSpPr>
+            <a:spLocks noGrp="1"/>
+          </p:cNvSpPr>
+          <p:nvPr>
+            <p:ph type="dt" idx="1"/>
+          </p:nvPr>
+        </p:nvSpPr>
+        <p:spPr>
+          <a:xfrm>
+            <a:off x="4143375" y="0"/>
+            <a:ext cx="3170238" cy="481013"/>
+          </a:xfrm>
+          <a:prstGeom prst="rect">
+            <a:avLst/>
+          </a:prstGeom>
+        </p:spPr>
+        <p:txBody>
+          <a:bodyPr vert="horz" lIns="91440" tIns="45720" rIns="91440" bIns="45720" rtlCol="0"/>
+          <a:lstStyle>
+            <a:lvl1pPr algn="r">
+              <a:defRPr sz="1200"/>
+            </a:lvl1pPr>
+          </a:lstStyle>
+          <a:p>
+            <a:fld id="{F668944D-3C9A-4FEA-8A68-0454D140FB77}" type="datetimeFigureOut">
+              <a:rPr lang="en-US" smtClean="0"/>
+              <a:t>9/12/2019</a:t>
+            </a:fld>
+            <a:endParaRPr lang="en-US"/>
+          </a:p>
+        </p:txBody>
+      </p:sp>
+      <p:sp>
+        <p:nvSpPr>
+          <p:cNvPr id="4" name="Slide Image Placeholder 3"/>
+          <p:cNvSpPr>
+            <a:spLocks noGrp="1" noRot="1" noChangeAspect="1"/>
+          </p:cNvSpPr>
+          <p:nvPr>
+            <p:ph type="sldImg" idx="2"/>
+          </p:nvPr>
+        </p:nvSpPr>
+        <p:spPr>
+          <a:xfrm>
+            <a:off x="777875" y="1200150"/>
+            <a:ext cx="5759450" cy="3240088"/>
+          </a:xfrm>
+          <a:prstGeom prst="rect">
+            <a:avLst/>
+          </a:prstGeom>
+          <a:noFill/>
+          <a:ln w="12700">
+            <a:solidFill>
+              <a:prstClr val="black"/>
+            </a:solidFill>
+          </a:ln>
+        </p:spPr>
+        <p:txBody>
+          <a:bodyPr vert="horz" lIns="91440" tIns="45720" rIns="91440" bIns="45720" rtlCol="0" anchor="ctr"/>
+          <a:lstStyle/>
+          <a:p>
+            <a:endParaRPr lang="en-US"/>
+          </a:p>
+        </p:txBody>
+      </p:sp>
+      <p:sp>
+        <p:nvSpPr>
+          <p:cNvPr id="5" name="Notes Placeholder 4"/>
+          <p:cNvSpPr>
+            <a:spLocks noGrp="1"/>
+          </p:cNvSpPr>
+          <p:nvPr>
+            <p:ph type="body" sz="quarter" idx="3"/>
+          </p:nvPr>
+        </p:nvSpPr>
+        <p:spPr>
+          <a:xfrm>
+            <a:off x="731838" y="4621213"/>
+            <a:ext cx="5851525" cy="3779837"/>
+          </a:xfrm>
+          <a:prstGeom prst="rect">
+            <a:avLst/>
+          </a:prstGeom>
+        </p:spPr>
+        <p:txBody>
+          <a:bodyPr vert="horz" lIns="91440" tIns="45720" rIns="91440" bIns="45720" rtlCol="0"/>
+          <a:lstStyle/>
+          <a:p>
+            <a:pPr lvl="0"/>
+            <a:r>
+              <a:rPr lang="en-US"/>
+              <a:t>Click to edit Master text styles</a:t>
+            </a:r>
+          </a:p>
+          <a:p>
+            <a:pPr lvl="1"/>
+            <a:r>
+              <a:rPr lang="en-US"/>
+              <a:t>Second level</a:t>
+            </a:r>
+          </a:p>
+          <a:p>
+            <a:pPr lvl="2"/>
+            <a:r>
+              <a:rPr lang="en-US"/>
+              <a:t>Third level</a:t>
+            </a:r>
+          </a:p>
+          <a:p>
+            <a:pPr lvl="3"/>
+            <a:r>
+              <a:rPr lang="en-US"/>
+              <a:t>Fourth level</a:t>
+            </a:r>
+          </a:p>
+          <a:p>
+            <a:pPr lvl="4"/>
+            <a:r>
+              <a:rPr lang="en-US"/>
+              <a:t>Fifth level</a:t>
+            </a:r>
+          </a:p>
+        </p:txBody>
+      </p:sp>
+      <p:sp>
+        <p:nvSpPr>
+          <p:cNvPr id="6" name="Footer Placeholder 5"/>
+          <p:cNvSpPr>
+            <a:spLocks noGrp="1"/>
+          </p:cNvSpPr>
+          <p:nvPr>
+            <p:ph type="ftr" sz="quarter" idx="4"/>
+          </p:nvPr>
+        </p:nvSpPr>
+        <p:spPr>
+          <a:xfrm>
+            <a:off x="0" y="9120188"/>
+            <a:ext cx="3170238" cy="481012"/>
+          </a:xfrm>
+          <a:prstGeom prst="rect">
+            <a:avLst/>
+          </a:prstGeom>
+        </p:spPr>
+        <p:txBody>
+          <a:bodyPr vert="horz" lIns="91440" tIns="45720" rIns="91440" bIns="45720" rtlCol="0" anchor="b"/>
+          <a:lstStyle>
+            <a:lvl1pPr algn="l">
+              <a:defRPr sz="1200"/>
+            </a:lvl1pPr>
+          </a:lstStyle>
+          <a:p>
+            <a:endParaRPr lang="en-US"/>
+          </a:p>
+        </p:txBody>
+      </p:sp>
+      <p:sp>
+        <p:nvSpPr>
+          <p:cNvPr id="7" name="Slide Number Placeholder 6"/>
+          <p:cNvSpPr>
+            <a:spLocks noGrp="1"/>
+          </p:cNvSpPr>
+          <p:nvPr>
+            <p:ph type="sldNum" sz="quarter" idx="5"/>
+          </p:nvPr>
+        </p:nvSpPr>
+        <p:spPr>
+          <a:xfrm>
+            <a:off x="4143375" y="9120188"/>
+            <a:ext cx="3170238" cy="481012"/>
+          </a:xfrm>
+          <a:prstGeom prst="rect">
+            <a:avLst/>
+          </a:prstGeom>
+        </p:spPr>
+        <p:txBody>
+          <a:bodyPr vert="horz" lIns="91440" tIns="45720" rIns="91440" bIns="45720" rtlCol="0" anchor="b"/>
+          <a:lstStyle>
+            <a:lvl1pPr algn="r">
+              <a:defRPr sz="1200"/>
+            </a:lvl1pPr>
+          </a:lstStyle>
+          <a:p>
+            <a:fld id="{18E4F76A-F4C0-4C41-A6C9-FB650DBC23AB}" type="slidenum">
+              <a:rPr lang="en-US" smtClean="0"/>
+              <a:t>‹#›</a:t>
+            </a:fld>
+            <a:endParaRPr lang="en-US"/>
+          </a:p>
+        </p:txBody>
+      </p:sp>
+    </p:spTree>
+    <p:extLst>
+      <p:ext uri="{BB962C8B-B14F-4D97-AF65-F5344CB8AC3E}">
+        <p14:creationId xmlns:p14="http://schemas.microsoft.com/office/powerpoint/2010/main" val="342188566"/>
+      </p:ext>
+    </p:extLst>
+  </p:cSld>
+  <p:clrMap bg1="lt1" tx1="dk1" bg2="lt2" tx2="dk2" accent1="accent1" accent2="accent2" accent3="accent3" accent4="accent4" accent5="accent5" accent6="accent6" hlink="hlink" folHlink="folHlink"/>
+  <p:notesStyle>
+    <a:lvl1pPr marL="0" algn="l" defTabSz="914400" rtl="0" eaLnBrk="1" latinLnBrk="0" hangingPunct="1">
+      <a:defRPr sz="1200" kern="1200">
+        <a:solidFill>
+          <a:schemeClr val="tx1"/>
+        </a:solidFill>
+        <a:latin typeface="+mn-lt"/>
+        <a:ea typeface="+mn-ea"/>
+        <a:cs typeface="+mn-cs"/>
+      </a:defRPr>
+    </a:lvl1pPr>
+    <a:lvl2pPr marL="457200" algn="l" defTabSz="914400" rtl="0" eaLnBrk="1" latinLnBrk="0" hangingPunct="1">
+      <a:defRPr sz="1200" kern="1200">
+        <a:solidFill>
+          <a:schemeClr val="tx1"/>
+        </a:solidFill>
+        <a:latin typeface="+mn-lt"/>
+        <a:ea typeface="+mn-ea"/>
+        <a:cs typeface="+mn-cs"/>
+      </a:defRPr>
+    </a:lvl2pPr>
+    <a:lvl3pPr marL="914400" algn="l" defTabSz="914400" rtl="0" eaLnBrk="1" latinLnBrk="0" hangingPunct="1">
+      <a:defRPr sz="1200" kern="1200">
+        <a:solidFill>
+          <a:schemeClr val="tx1"/>
+        </a:solidFill>
+        <a:latin typeface="+mn-lt"/>
+        <a:ea typeface="+mn-ea"/>
+        <a:cs typeface="+mn-cs"/>
+      </a:defRPr>
+    </a:lvl3pPr>
+    <a:lvl4pPr marL="1371600" algn="l" defTabSz="914400" rtl="0" eaLnBrk="1" latinLnBrk="0" hangingPunct="1">
+      <a:defRPr sz="1200" kern="1200">
+        <a:solidFill>
+          <a:schemeClr val="tx1"/>
+        </a:solidFill>
+        <a:latin typeface="+mn-lt"/>
+        <a:ea typeface="+mn-ea"/>
+        <a:cs typeface="+mn-cs"/>
+      </a:defRPr>
+    </a:lvl4pPr>
+    <a:lvl5pPr marL="1828800" algn="l" defTabSz="914400" rtl="0" eaLnBrk="1" latinLnBrk="0" hangingPunct="1">
+      <a:defRPr sz="1200" kern="1200">
+        <a:solidFill>
+          <a:schemeClr val="tx1"/>
+        </a:solidFill>
+        <a:latin typeface="+mn-lt"/>
+        <a:ea typeface="+mn-ea"/>
+        <a:cs typeface="+mn-cs"/>
+      </a:defRPr>
+    </a:lvl5pPr>
+    <a:lvl6pPr marL="2286000" algn="l" defTabSz="914400" rtl="0" eaLnBrk="1" latinLnBrk="0" hangingPunct="1">
+      <a:defRPr sz="1200" kern="1200">
+        <a:solidFill>
+          <a:schemeClr val="tx1"/>
+        </a:solidFill>
+        <a:latin typeface="+mn-lt"/>
+        <a:ea typeface="+mn-ea"/>
+        <a:cs typeface="+mn-cs"/>
+      </a:defRPr>
+    </a:lvl6pPr>
+    <a:lvl7pPr marL="2743200" algn="l" defTabSz="914400" rtl="0" eaLnBrk="1" latinLnBrk="0" hangingPunct="1">
+      <a:defRPr sz="1200" kern="1200">
+        <a:solidFill>
+          <a:schemeClr val="tx1"/>
+        </a:solidFill>
+        <a:latin typeface="+mn-lt"/>
+        <a:ea typeface="+mn-ea"/>
+        <a:cs typeface="+mn-cs"/>
+      </a:defRPr>
+    </a:lvl7pPr>
+    <a:lvl8pPr marL="3200400" algn="l" defTabSz="914400" rtl="0" eaLnBrk="1" latinLnBrk="0" hangingPunct="1">
+      <a:defRPr sz="1200" kern="1200">
+        <a:solidFill>
+          <a:schemeClr val="tx1"/>
+        </a:solidFill>
+        <a:latin typeface="+mn-lt"/>
+        <a:ea typeface="+mn-ea"/>
+        <a:cs typeface="+mn-cs"/>
+      </a:defRPr>
+    </a:lvl8pPr>
+    <a:lvl9pPr marL="3657600" algn="l" defTabSz="914400" rtl="0" eaLnBrk="1" latinLnBrk="0" hangingPunct="1">
+      <a:defRPr sz="1200" kern="1200">
+        <a:solidFill>
+          <a:schemeClr val="tx1"/>
+        </a:solidFill>
+        <a:latin typeface="+mn-lt"/>
+        <a:ea typeface="+mn-ea"/>
+        <a:cs typeface="+mn-cs"/>
+      </a:defRPr>
+    </a:lvl9pPr>
+  </p:notesStyle>
+</p:notesMaster>
+</file>
+
 <file path=ppt/slideLayouts/slideLayout1.xml><?xml version="1.0" encoding="utf-8"?>
 <p:sldLayout xmlns:a="http://schemas.openxmlformats.org/drawingml/2006/main" xmlns:r="http://schemas.openxmlformats.org/officeDocument/2006/relationships" xmlns:p="http://schemas.openxmlformats.org/presentationml/2006/main" showMasterSp="0" type="title" preserve="1">
   <p:cSld name="Title Slide">
@@ -614,10 +966,9 @@
             </a:lvl1pPr>
           </a:lstStyle>
           <a:p>
-            <a:fld id="{5923F103-BC34-4FE4-A40E-EDDEECFDA5D0}" type="datetimeFigureOut">
-              <a:rPr lang="en-US" dirty="0"/>
-              <a:pPr/>
-              <a:t>7/10/2019</a:t>
+            <a:fld id="{2EB003AA-A186-403E-B40F-CA0D80D19802}" type="datetime1">
+              <a:rPr lang="en-US" smtClean="0"/>
+              <a:t>9/12/2019</a:t>
             </a:fld>
             <a:endParaRPr lang="en-US" dirty="0"/>
           </a:p>
@@ -654,10 +1005,10 @@
           </a:lstStyle>
           <a:p>
             <a:r>
-              <a:rPr lang="en-US" dirty="0"/>
-              <a:t>
-              </a:t>
-            </a:r>
+              <a:rPr lang="en-US"/>
+              <a:t>Rochester MakerSpace 2019</a:t>
+            </a:r>
+            <a:endParaRPr lang="en-US" dirty="0"/>
           </a:p>
         </p:txBody>
       </p:sp>
@@ -1703,9 +2054,9 @@
           <a:bodyPr/>
           <a:lstStyle/>
           <a:p>
-            <a:fld id="{923A1CC3-2375-41D4-9E03-427CAF2A4C1A}" type="datetimeFigureOut">
-              <a:rPr lang="en-US" dirty="0"/>
-              <a:t>7/10/2019</a:t>
+            <a:fld id="{73170056-118A-491D-9AE6-FFD6BA5B0F8C}" type="datetime1">
+              <a:rPr lang="en-US" smtClean="0"/>
+              <a:t>9/12/2019</a:t>
             </a:fld>
             <a:endParaRPr lang="en-US" dirty="0"/>
           </a:p>
@@ -1727,10 +2078,10 @@
           <a:lstStyle/>
           <a:p>
             <a:r>
-              <a:rPr lang="en-US" dirty="0"/>
-              <a:t>
-              </a:t>
-            </a:r>
+              <a:rPr lang="en-US"/>
+              <a:t>Rochester MakerSpace 2019</a:t>
+            </a:r>
+            <a:endParaRPr lang="en-US" dirty="0"/>
           </a:p>
         </p:txBody>
       </p:sp>
@@ -2683,9 +3034,9 @@
           <a:bodyPr/>
           <a:lstStyle/>
           <a:p>
-            <a:fld id="{AFF16868-8199-4C2C-A5B1-63AEE139F88E}" type="datetimeFigureOut">
-              <a:rPr lang="en-US" dirty="0"/>
-              <a:t>7/10/2019</a:t>
+            <a:fld id="{FA7E02BB-FBCF-4393-BCCA-DC132ECE7180}" type="datetime1">
+              <a:rPr lang="en-US" smtClean="0"/>
+              <a:t>9/12/2019</a:t>
             </a:fld>
             <a:endParaRPr lang="en-US" dirty="0"/>
           </a:p>
@@ -2707,10 +3058,10 @@
           <a:lstStyle/>
           <a:p>
             <a:r>
-              <a:rPr lang="en-US" dirty="0"/>
-              <a:t>
-              </a:t>
-            </a:r>
+              <a:rPr lang="en-US"/>
+              <a:t>Rochester MakerSpace 2019</a:t>
+            </a:r>
+            <a:endParaRPr lang="en-US" dirty="0"/>
           </a:p>
         </p:txBody>
       </p:sp>
@@ -3817,9 +4168,9 @@
           <a:bodyPr/>
           <a:lstStyle/>
           <a:p>
-            <a:fld id="{AAD9FF7F-6988-44CC-821B-644E70CD2F73}" type="datetimeFigureOut">
-              <a:rPr lang="en-US" dirty="0"/>
-              <a:t>7/10/2019</a:t>
+            <a:fld id="{4D059B24-5B0F-409E-A6BB-11FE0D833521}" type="datetime1">
+              <a:rPr lang="en-US" smtClean="0"/>
+              <a:t>9/12/2019</a:t>
             </a:fld>
             <a:endParaRPr lang="en-US" dirty="0"/>
           </a:p>
@@ -3841,10 +4192,10 @@
           <a:lstStyle/>
           <a:p>
             <a:r>
-              <a:rPr lang="en-US" dirty="0"/>
-              <a:t>
-              </a:t>
-            </a:r>
+              <a:rPr lang="en-US"/>
+              <a:t>Rochester MakerSpace 2019</a:t>
+            </a:r>
+            <a:endParaRPr lang="en-US" dirty="0"/>
           </a:p>
         </p:txBody>
       </p:sp>
@@ -4850,9 +5201,9 @@
           <a:bodyPr/>
           <a:lstStyle/>
           <a:p>
-            <a:fld id="{5C12C299-16B2-4475-990D-751901EACC14}" type="datetimeFigureOut">
-              <a:rPr lang="en-US" dirty="0"/>
-              <a:t>7/10/2019</a:t>
+            <a:fld id="{3422E4E0-8F17-454C-99F3-E37970680F97}" type="datetime1">
+              <a:rPr lang="en-US" smtClean="0"/>
+              <a:t>9/12/2019</a:t>
             </a:fld>
             <a:endParaRPr lang="en-US" dirty="0"/>
           </a:p>
@@ -4874,10 +5225,10 @@
           <a:lstStyle/>
           <a:p>
             <a:r>
-              <a:rPr lang="en-US" dirty="0"/>
-              <a:t>
-              </a:t>
-            </a:r>
+              <a:rPr lang="en-US"/>
+              <a:t>Rochester MakerSpace 2019</a:t>
+            </a:r>
+            <a:endParaRPr lang="en-US" dirty="0"/>
           </a:p>
         </p:txBody>
       </p:sp>
@@ -5510,9 +5861,9 @@
           <a:bodyPr/>
           <a:lstStyle/>
           <a:p>
-            <a:fld id="{9FE86839-B9D8-4651-8783-F325ECE74E65}" type="datetimeFigureOut">
-              <a:rPr lang="en-US" dirty="0"/>
-              <a:t>7/10/2019</a:t>
+            <a:fld id="{B346AADE-8902-4609-BCCF-542F92F9AEC3}" type="datetime1">
+              <a:rPr lang="en-US" smtClean="0"/>
+              <a:t>9/12/2019</a:t>
             </a:fld>
             <a:endParaRPr lang="en-US" dirty="0"/>
           </a:p>
@@ -5534,10 +5885,10 @@
           <a:lstStyle/>
           <a:p>
             <a:r>
-              <a:rPr lang="en-US" dirty="0"/>
-              <a:t>
-              </a:t>
-            </a:r>
+              <a:rPr lang="en-US"/>
+              <a:t>Rochester MakerSpace 2019</a:t>
+            </a:r>
+            <a:endParaRPr lang="en-US" dirty="0"/>
           </a:p>
         </p:txBody>
       </p:sp>
@@ -6371,9 +6722,9 @@
           <a:bodyPr/>
           <a:lstStyle/>
           <a:p>
-            <a:fld id="{FD484F64-32F6-45C5-931F-ADC1662401D0}" type="datetimeFigureOut">
-              <a:rPr lang="en-US" dirty="0"/>
-              <a:t>7/10/2019</a:t>
+            <a:fld id="{8688E6D5-E9A1-42E5-8361-B2EDAB19A0AB}" type="datetime1">
+              <a:rPr lang="en-US" smtClean="0"/>
+              <a:t>9/12/2019</a:t>
             </a:fld>
             <a:endParaRPr lang="en-US" dirty="0"/>
           </a:p>
@@ -6400,10 +6751,10 @@
           <a:lstStyle/>
           <a:p>
             <a:r>
-              <a:rPr lang="en-US" dirty="0"/>
-              <a:t>
-              </a:t>
-            </a:r>
+              <a:rPr lang="en-US"/>
+              <a:t>Rochester MakerSpace 2019</a:t>
+            </a:r>
+            <a:endParaRPr lang="en-US" dirty="0"/>
           </a:p>
         </p:txBody>
       </p:sp>
@@ -6561,9 +6912,9 @@
           <a:bodyPr/>
           <a:lstStyle/>
           <a:p>
-            <a:fld id="{53086D93-FCAC-47E0-A2EE-787E62CA814C}" type="datetimeFigureOut">
-              <a:rPr lang="en-US" dirty="0"/>
-              <a:t>7/10/2019</a:t>
+            <a:fld id="{2B237CEF-0408-470A-9E66-F738D787136A}" type="datetime1">
+              <a:rPr lang="en-US" smtClean="0"/>
+              <a:t>9/12/2019</a:t>
             </a:fld>
             <a:endParaRPr lang="en-US" dirty="0"/>
           </a:p>
@@ -6585,10 +6936,10 @@
           <a:lstStyle/>
           <a:p>
             <a:r>
-              <a:rPr lang="en-US" dirty="0"/>
-              <a:t>
-              </a:t>
-            </a:r>
+              <a:rPr lang="en-US"/>
+              <a:t>Rochester MakerSpace 2019</a:t>
+            </a:r>
+            <a:endParaRPr lang="en-US" dirty="0"/>
           </a:p>
         </p:txBody>
       </p:sp>
@@ -7533,9 +7884,9 @@
           <a:bodyPr/>
           <a:lstStyle/>
           <a:p>
-            <a:fld id="{CDA879A6-0FD0-4734-A311-86BFCA472E6E}" type="datetimeFigureOut">
-              <a:rPr lang="en-US" dirty="0"/>
-              <a:t>7/10/2019</a:t>
+            <a:fld id="{236D46FA-6744-4F92-A2EE-41DC3AE0E489}" type="datetime1">
+              <a:rPr lang="en-US" smtClean="0"/>
+              <a:t>9/12/2019</a:t>
             </a:fld>
             <a:endParaRPr lang="en-US" dirty="0"/>
           </a:p>
@@ -7557,10 +7908,10 @@
           <a:lstStyle/>
           <a:p>
             <a:r>
-              <a:rPr lang="en-US" dirty="0"/>
-              <a:t>
-              </a:t>
-            </a:r>
+              <a:rPr lang="en-US"/>
+              <a:t>Rochester MakerSpace 2019</a:t>
+            </a:r>
+            <a:endParaRPr lang="en-US" dirty="0"/>
           </a:p>
         </p:txBody>
       </p:sp>
@@ -7744,9 +8095,9 @@
           <a:bodyPr/>
           <a:lstStyle/>
           <a:p>
-            <a:fld id="{19C9CA7B-DFD4-44B5-8C60-D14B8CD1FB59}" type="datetimeFigureOut">
-              <a:rPr lang="en-US" dirty="0"/>
-              <a:t>7/10/2019</a:t>
+            <a:fld id="{5B414860-4C29-4317-8C51-C8F42F567418}" type="datetime1">
+              <a:rPr lang="en-US" smtClean="0"/>
+              <a:t>9/12/2019</a:t>
             </a:fld>
             <a:endParaRPr lang="en-US" dirty="0"/>
           </a:p>
@@ -7768,10 +8119,10 @@
           <a:lstStyle/>
           <a:p>
             <a:r>
-              <a:rPr lang="en-US" dirty="0"/>
-              <a:t>
-              </a:t>
-            </a:r>
+              <a:rPr lang="en-US"/>
+              <a:t>Rochester MakerSpace 2019</a:t>
+            </a:r>
+            <a:endParaRPr lang="en-US" dirty="0"/>
           </a:p>
         </p:txBody>
       </p:sp>
@@ -8778,9 +9129,9 @@
           <a:bodyPr/>
           <a:lstStyle/>
           <a:p>
-            <a:fld id="{F34E6425-0181-43F2-84FC-787E803FD2F8}" type="datetimeFigureOut">
-              <a:rPr lang="en-US" dirty="0"/>
-              <a:t>7/10/2019</a:t>
+            <a:fld id="{C51DA914-AF10-40ED-809F-873BC003367F}" type="datetime1">
+              <a:rPr lang="en-US" smtClean="0"/>
+              <a:t>9/12/2019</a:t>
             </a:fld>
             <a:endParaRPr lang="en-US" dirty="0"/>
           </a:p>
@@ -8802,10 +9153,10 @@
           <a:lstStyle/>
           <a:p>
             <a:r>
-              <a:rPr lang="en-US" dirty="0"/>
-              <a:t>
-              </a:t>
-            </a:r>
+              <a:rPr lang="en-US"/>
+              <a:t>Rochester MakerSpace 2019</a:t>
+            </a:r>
+            <a:endParaRPr lang="en-US" dirty="0"/>
           </a:p>
         </p:txBody>
       </p:sp>
@@ -9050,9 +9401,9 @@
           <a:bodyPr/>
           <a:lstStyle/>
           <a:p>
-            <a:fld id="{3BDB8791-F1B0-41E7-B7FD-A781E65C4266}" type="datetimeFigureOut">
-              <a:rPr lang="en-US" dirty="0"/>
-              <a:t>7/10/2019</a:t>
+            <a:fld id="{2DF15697-1E0E-4154-BD03-5C8AE97FC665}" type="datetime1">
+              <a:rPr lang="en-US" smtClean="0"/>
+              <a:t>9/12/2019</a:t>
             </a:fld>
             <a:endParaRPr lang="en-US" dirty="0"/>
           </a:p>
@@ -9074,10 +9425,10 @@
           <a:lstStyle/>
           <a:p>
             <a:r>
-              <a:rPr lang="en-US" dirty="0"/>
-              <a:t>
-              </a:t>
-            </a:r>
+              <a:rPr lang="en-US"/>
+              <a:t>Rochester MakerSpace 2019</a:t>
+            </a:r>
+            <a:endParaRPr lang="en-US" dirty="0"/>
           </a:p>
         </p:txBody>
       </p:sp>
@@ -9460,9 +9811,9 @@
           <a:bodyPr/>
           <a:lstStyle/>
           <a:p>
-            <a:fld id="{5FDD63B2-E120-4ED8-B27B-C685F510A5FE}" type="datetimeFigureOut">
-              <a:rPr lang="en-US" dirty="0"/>
-              <a:t>7/10/2019</a:t>
+            <a:fld id="{2C0545CB-6A7B-40EA-AB25-C2D74D0997BD}" type="datetime1">
+              <a:rPr lang="en-US" smtClean="0"/>
+              <a:t>9/12/2019</a:t>
             </a:fld>
             <a:endParaRPr lang="en-US" dirty="0"/>
           </a:p>
@@ -9484,10 +9835,10 @@
           <a:lstStyle/>
           <a:p>
             <a:r>
-              <a:rPr lang="en-US" dirty="0"/>
-              <a:t>
-              </a:t>
-            </a:r>
+              <a:rPr lang="en-US"/>
+              <a:t>Rochester MakerSpace 2019</a:t>
+            </a:r>
+            <a:endParaRPr lang="en-US" dirty="0"/>
           </a:p>
         </p:txBody>
       </p:sp>
@@ -9587,9 +9938,9 @@
           <a:bodyPr/>
           <a:lstStyle/>
           <a:p>
-            <a:fld id="{7AA18ACC-A947-437B-A130-35BD54FDF1E9}" type="datetimeFigureOut">
-              <a:rPr lang="en-US" dirty="0"/>
-              <a:t>7/10/2019</a:t>
+            <a:fld id="{C6F3B242-92FD-458A-B575-EFD7C034DE79}" type="datetime1">
+              <a:rPr lang="en-US" smtClean="0"/>
+              <a:t>9/12/2019</a:t>
             </a:fld>
             <a:endParaRPr lang="en-US" dirty="0"/>
           </a:p>
@@ -9611,10 +9962,10 @@
           <a:lstStyle/>
           <a:p>
             <a:r>
-              <a:rPr lang="en-US" dirty="0"/>
-              <a:t>
-              </a:t>
-            </a:r>
+              <a:rPr lang="en-US"/>
+              <a:t>Rochester MakerSpace 2019</a:t>
+            </a:r>
+            <a:endParaRPr lang="en-US" dirty="0"/>
           </a:p>
         </p:txBody>
       </p:sp>
@@ -9682,9 +10033,9 @@
           <a:bodyPr/>
           <a:lstStyle/>
           <a:p>
-            <a:fld id="{7C8D7E02-BCB8-4D50-A234-369438C08659}" type="datetimeFigureOut">
-              <a:rPr lang="en-US" dirty="0"/>
-              <a:t>7/10/2019</a:t>
+            <a:fld id="{BDC34E49-9723-424E-8E99-747562F4CCD8}" type="datetime1">
+              <a:rPr lang="en-US" smtClean="0"/>
+              <a:t>9/12/2019</a:t>
             </a:fld>
             <a:endParaRPr lang="en-US" dirty="0"/>
           </a:p>
@@ -9706,10 +10057,10 @@
           <a:lstStyle/>
           <a:p>
             <a:r>
-              <a:rPr lang="en-US" dirty="0"/>
-              <a:t>
-              </a:t>
-            </a:r>
+              <a:rPr lang="en-US"/>
+              <a:t>Rochester MakerSpace 2019</a:t>
+            </a:r>
+            <a:endParaRPr lang="en-US" dirty="0"/>
           </a:p>
         </p:txBody>
       </p:sp>
@@ -10763,9 +11114,9 @@
           <a:bodyPr/>
           <a:lstStyle/>
           <a:p>
-            <a:fld id="{76E86A4C-8E40-4F87-A4F0-01A0687C5742}" type="datetimeFigureOut">
-              <a:rPr lang="en-US" dirty="0"/>
-              <a:t>7/10/2019</a:t>
+            <a:fld id="{1C6E4D46-697B-41D4-BFA6-43B410F3B65B}" type="datetime1">
+              <a:rPr lang="en-US" smtClean="0"/>
+              <a:t>9/12/2019</a:t>
             </a:fld>
             <a:endParaRPr lang="en-US" dirty="0"/>
           </a:p>
@@ -10787,10 +11138,10 @@
           <a:lstStyle/>
           <a:p>
             <a:r>
-              <a:rPr lang="en-US" dirty="0"/>
-              <a:t>
-              </a:t>
-            </a:r>
+              <a:rPr lang="en-US"/>
+              <a:t>Rochester MakerSpace 2019</a:t>
+            </a:r>
+            <a:endParaRPr lang="en-US" dirty="0"/>
           </a:p>
         </p:txBody>
       </p:sp>
@@ -11871,9 +12222,9 @@
           <a:bodyPr/>
           <a:lstStyle/>
           <a:p>
-            <a:fld id="{35E72C73-2D91-4E12-BA25-F0AA0C03599B}" type="datetimeFigureOut">
-              <a:rPr lang="en-US" dirty="0"/>
-              <a:t>7/10/2019</a:t>
+            <a:fld id="{C46F7A30-26DA-4CD0-A6EE-C5929620741E}" type="datetime1">
+              <a:rPr lang="en-US" smtClean="0"/>
+              <a:t>9/12/2019</a:t>
             </a:fld>
             <a:endParaRPr lang="en-US" dirty="0"/>
           </a:p>
@@ -11895,10 +12246,10 @@
           <a:lstStyle/>
           <a:p>
             <a:r>
-              <a:rPr lang="en-US" dirty="0"/>
-              <a:t>
-              </a:t>
-            </a:r>
+              <a:rPr lang="en-US"/>
+              <a:t>Rochester MakerSpace 2019</a:t>
+            </a:r>
+            <a:endParaRPr lang="en-US" dirty="0"/>
           </a:p>
         </p:txBody>
       </p:sp>
@@ -12868,9 +13219,9 @@
             </a:lvl1pPr>
           </a:lstStyle>
           <a:p>
-            <a:fld id="{2BE451C3-0FF4-47C4-B829-773ADF60F88C}" type="datetimeFigureOut">
-              <a:rPr lang="en-US" dirty="0"/>
-              <a:t>7/10/2019</a:t>
+            <a:fld id="{DB7D68CB-0922-4C3F-8B66-08244DAE79F9}" type="datetime1">
+              <a:rPr lang="en-US" smtClean="0"/>
+              <a:t>9/12/2019</a:t>
             </a:fld>
             <a:endParaRPr lang="en-US" dirty="0"/>
           </a:p>
@@ -12908,10 +13259,10 @@
           </a:lstStyle>
           <a:p>
             <a:r>
-              <a:rPr lang="en-US" dirty="0"/>
-              <a:t>
-              </a:t>
-            </a:r>
+              <a:rPr lang="en-US"/>
+              <a:t>Rochester MakerSpace 2019</a:t>
+            </a:r>
+            <a:endParaRPr lang="en-US" dirty="0"/>
           </a:p>
         </p:txBody>
       </p:sp>
@@ -13013,7 +13364,7 @@
     <p:sldLayoutId id="2147483658" r:id="rId16"/>
     <p:sldLayoutId id="2147483659" r:id="rId17"/>
   </p:sldLayoutIdLst>
-  <p:hf sldNum="0" hdr="0" ftr="0" dt="0"/>
+  <p:hf hdr="0" dt="0"/>
   <p:txStyles>
     <p:titleStyle>
       <a:lvl1pPr algn="l" defTabSz="457200" rtl="0" eaLnBrk="1" latinLnBrk="0" hangingPunct="1">
@@ -13579,6 +13930,65 @@
           </a:p>
         </p:txBody>
       </p:sp>
+      <p:sp>
+        <p:nvSpPr>
+          <p:cNvPr id="4" name="Footer Placeholder 3">
+            <a:extLst>
+              <a:ext uri="{FF2B5EF4-FFF2-40B4-BE49-F238E27FC236}">
+                <a16:creationId xmlns:a16="http://schemas.microsoft.com/office/drawing/2014/main" id="{E82F1815-5744-4BF5-872E-BF8553BD2760}"/>
+              </a:ext>
+            </a:extLst>
+          </p:cNvPr>
+          <p:cNvSpPr>
+            <a:spLocks noGrp="1"/>
+          </p:cNvSpPr>
+          <p:nvPr>
+            <p:ph type="ftr" sz="quarter" idx="11"/>
+          </p:nvPr>
+        </p:nvSpPr>
+        <p:spPr/>
+        <p:txBody>
+          <a:bodyPr/>
+          <a:lstStyle/>
+          <a:p>
+            <a:r>
+              <a:rPr lang="en-US"/>
+              <a:t>Rochester MakerSpace 2019</a:t>
+            </a:r>
+            <a:endParaRPr lang="en-US" dirty="0"/>
+          </a:p>
+        </p:txBody>
+      </p:sp>
+      <p:sp>
+        <p:nvSpPr>
+          <p:cNvPr id="5" name="Slide Number Placeholder 4">
+            <a:extLst>
+              <a:ext uri="{FF2B5EF4-FFF2-40B4-BE49-F238E27FC236}">
+                <a16:creationId xmlns:a16="http://schemas.microsoft.com/office/drawing/2014/main" id="{F6365E9D-FAFF-4E21-9800-A6294C4A6317}"/>
+              </a:ext>
+            </a:extLst>
+          </p:cNvPr>
+          <p:cNvSpPr>
+            <a:spLocks noGrp="1"/>
+          </p:cNvSpPr>
+          <p:nvPr>
+            <p:ph type="sldNum" sz="quarter" idx="12"/>
+          </p:nvPr>
+        </p:nvSpPr>
+        <p:spPr/>
+        <p:txBody>
+          <a:bodyPr/>
+          <a:lstStyle/>
+          <a:p>
+            <a:fld id="{D57F1E4F-1CFF-5643-939E-217C01CDF565}" type="slidenum">
+              <a:rPr lang="en-US" smtClean="0"/>
+              <a:pPr/>
+              <a:t>2</a:t>
+            </a:fld>
+            <a:endParaRPr lang="en-US" dirty="0"/>
+          </a:p>
+        </p:txBody>
+      </p:sp>
     </p:spTree>
     <p:extLst>
       <p:ext uri="{BB962C8B-B14F-4D97-AF65-F5344CB8AC3E}">
@@ -13718,7 +14128,15 @@
           <a:p>
             <a:r>
               <a:rPr lang="en-US" sz="1200" dirty="0"/>
-              <a:t>Micro SD port for loading your operating system and storing data</a:t>
+              <a:t>Micro SD port for </a:t>
+            </a:r>
+            <a:r>
+              <a:rPr lang="en-US" sz="1200"/>
+              <a:t>loading operating </a:t>
+            </a:r>
+            <a:r>
+              <a:rPr lang="en-US" sz="1200" dirty="0"/>
+              <a:t>system and storing data</a:t>
             </a:r>
           </a:p>
           <a:p>
@@ -13758,6 +14176,65 @@
           </a:prstGeom>
         </p:spPr>
       </p:pic>
+      <p:sp>
+        <p:nvSpPr>
+          <p:cNvPr id="5" name="Footer Placeholder 4">
+            <a:extLst>
+              <a:ext uri="{FF2B5EF4-FFF2-40B4-BE49-F238E27FC236}">
+                <a16:creationId xmlns:a16="http://schemas.microsoft.com/office/drawing/2014/main" id="{66EFA7FA-593E-4E3C-B13B-FE93F94519C3}"/>
+              </a:ext>
+            </a:extLst>
+          </p:cNvPr>
+          <p:cNvSpPr>
+            <a:spLocks noGrp="1"/>
+          </p:cNvSpPr>
+          <p:nvPr>
+            <p:ph type="ftr" sz="quarter" idx="11"/>
+          </p:nvPr>
+        </p:nvSpPr>
+        <p:spPr/>
+        <p:txBody>
+          <a:bodyPr/>
+          <a:lstStyle/>
+          <a:p>
+            <a:r>
+              <a:rPr lang="en-US"/>
+              <a:t>Rochester MakerSpace 2019</a:t>
+            </a:r>
+            <a:endParaRPr lang="en-US" dirty="0"/>
+          </a:p>
+        </p:txBody>
+      </p:sp>
+      <p:sp>
+        <p:nvSpPr>
+          <p:cNvPr id="6" name="Slide Number Placeholder 5">
+            <a:extLst>
+              <a:ext uri="{FF2B5EF4-FFF2-40B4-BE49-F238E27FC236}">
+                <a16:creationId xmlns:a16="http://schemas.microsoft.com/office/drawing/2014/main" id="{381527EF-8EBC-4639-86F1-3713F211E237}"/>
+              </a:ext>
+            </a:extLst>
+          </p:cNvPr>
+          <p:cNvSpPr>
+            <a:spLocks noGrp="1"/>
+          </p:cNvSpPr>
+          <p:nvPr>
+            <p:ph type="sldNum" sz="quarter" idx="12"/>
+          </p:nvPr>
+        </p:nvSpPr>
+        <p:spPr/>
+        <p:txBody>
+          <a:bodyPr/>
+          <a:lstStyle/>
+          <a:p>
+            <a:fld id="{D57F1E4F-1CFF-5643-939E-217C01CDF565}" type="slidenum">
+              <a:rPr lang="en-US" smtClean="0"/>
+              <a:pPr/>
+              <a:t>3</a:t>
+            </a:fld>
+            <a:endParaRPr lang="en-US" dirty="0"/>
+          </a:p>
+        </p:txBody>
+      </p:sp>
     </p:spTree>
     <p:extLst>
       <p:ext uri="{BB962C8B-B14F-4D97-AF65-F5344CB8AC3E}">
@@ -13929,6 +14406,65 @@
           </a:prstGeom>
         </p:spPr>
       </p:pic>
+      <p:sp>
+        <p:nvSpPr>
+          <p:cNvPr id="5" name="Footer Placeholder 4">
+            <a:extLst>
+              <a:ext uri="{FF2B5EF4-FFF2-40B4-BE49-F238E27FC236}">
+                <a16:creationId xmlns:a16="http://schemas.microsoft.com/office/drawing/2014/main" id="{D08513CC-C787-416F-A1DD-36294962AA69}"/>
+              </a:ext>
+            </a:extLst>
+          </p:cNvPr>
+          <p:cNvSpPr>
+            <a:spLocks noGrp="1"/>
+          </p:cNvSpPr>
+          <p:nvPr>
+            <p:ph type="ftr" sz="quarter" idx="11"/>
+          </p:nvPr>
+        </p:nvSpPr>
+        <p:spPr/>
+        <p:txBody>
+          <a:bodyPr/>
+          <a:lstStyle/>
+          <a:p>
+            <a:r>
+              <a:rPr lang="en-US"/>
+              <a:t>Rochester MakerSpace 2019</a:t>
+            </a:r>
+            <a:endParaRPr lang="en-US" dirty="0"/>
+          </a:p>
+        </p:txBody>
+      </p:sp>
+      <p:sp>
+        <p:nvSpPr>
+          <p:cNvPr id="6" name="Slide Number Placeholder 5">
+            <a:extLst>
+              <a:ext uri="{FF2B5EF4-FFF2-40B4-BE49-F238E27FC236}">
+                <a16:creationId xmlns:a16="http://schemas.microsoft.com/office/drawing/2014/main" id="{A8A29384-FD31-4836-B899-049B79EA471F}"/>
+              </a:ext>
+            </a:extLst>
+          </p:cNvPr>
+          <p:cNvSpPr>
+            <a:spLocks noGrp="1"/>
+          </p:cNvSpPr>
+          <p:nvPr>
+            <p:ph type="sldNum" sz="quarter" idx="12"/>
+          </p:nvPr>
+        </p:nvSpPr>
+        <p:spPr/>
+        <p:txBody>
+          <a:bodyPr/>
+          <a:lstStyle/>
+          <a:p>
+            <a:fld id="{D57F1E4F-1CFF-5643-939E-217C01CDF565}" type="slidenum">
+              <a:rPr lang="en-US" smtClean="0"/>
+              <a:pPr/>
+              <a:t>4</a:t>
+            </a:fld>
+            <a:endParaRPr lang="en-US" dirty="0"/>
+          </a:p>
+        </p:txBody>
+      </p:sp>
     </p:spTree>
     <p:extLst>
       <p:ext uri="{BB962C8B-B14F-4D97-AF65-F5344CB8AC3E}">
@@ -14018,12 +14554,8 @@
           </a:p>
           <a:p>
             <a:r>
-              <a:rPr lang="en-US"/>
-              <a:t>Raspberry </a:t>
-            </a:r>
-            <a:r>
               <a:rPr lang="en-US" dirty="0"/>
-              <a:t>Pi 4 offers a faster processor, two USB 3.0 ports, two (micro) HDMI ports, options of 1GB, 2GB, or 4GB of RAM</a:t>
+              <a:t>Raspberry Pi 4 offers a faster processor, two USB 3.0 ports, two (micro) HDMI ports, options of 1GB, 2GB, or 4GB of RAM</a:t>
             </a:r>
           </a:p>
           <a:p>
@@ -14056,7 +14588,7 @@
         </p:blipFill>
         <p:spPr>
           <a:xfrm>
-            <a:off x="5213081" y="709612"/>
+            <a:off x="5535660" y="1316848"/>
             <a:ext cx="6229350" cy="5438775"/>
           </a:xfrm>
           <a:prstGeom prst="rect">
@@ -14064,6 +14596,65 @@
           </a:prstGeom>
         </p:spPr>
       </p:pic>
+      <p:sp>
+        <p:nvSpPr>
+          <p:cNvPr id="5" name="Footer Placeholder 4">
+            <a:extLst>
+              <a:ext uri="{FF2B5EF4-FFF2-40B4-BE49-F238E27FC236}">
+                <a16:creationId xmlns:a16="http://schemas.microsoft.com/office/drawing/2014/main" id="{538F1A3E-62B7-45C0-8B90-9B1148941FB6}"/>
+              </a:ext>
+            </a:extLst>
+          </p:cNvPr>
+          <p:cNvSpPr>
+            <a:spLocks noGrp="1"/>
+          </p:cNvSpPr>
+          <p:nvPr>
+            <p:ph type="ftr" sz="quarter" idx="11"/>
+          </p:nvPr>
+        </p:nvSpPr>
+        <p:spPr/>
+        <p:txBody>
+          <a:bodyPr/>
+          <a:lstStyle/>
+          <a:p>
+            <a:r>
+              <a:rPr lang="en-US"/>
+              <a:t>Rochester MakerSpace 2019</a:t>
+            </a:r>
+            <a:endParaRPr lang="en-US" dirty="0"/>
+          </a:p>
+        </p:txBody>
+      </p:sp>
+      <p:sp>
+        <p:nvSpPr>
+          <p:cNvPr id="6" name="Slide Number Placeholder 5">
+            <a:extLst>
+              <a:ext uri="{FF2B5EF4-FFF2-40B4-BE49-F238E27FC236}">
+                <a16:creationId xmlns:a16="http://schemas.microsoft.com/office/drawing/2014/main" id="{E1A731E7-0390-40F3-A8D3-E1F7F36FE185}"/>
+              </a:ext>
+            </a:extLst>
+          </p:cNvPr>
+          <p:cNvSpPr>
+            <a:spLocks noGrp="1"/>
+          </p:cNvSpPr>
+          <p:nvPr>
+            <p:ph type="sldNum" sz="quarter" idx="12"/>
+          </p:nvPr>
+        </p:nvSpPr>
+        <p:spPr/>
+        <p:txBody>
+          <a:bodyPr/>
+          <a:lstStyle/>
+          <a:p>
+            <a:fld id="{D57F1E4F-1CFF-5643-939E-217C01CDF565}" type="slidenum">
+              <a:rPr lang="en-US" smtClean="0"/>
+              <a:pPr/>
+              <a:t>5</a:t>
+            </a:fld>
+            <a:endParaRPr lang="en-US" dirty="0"/>
+          </a:p>
+        </p:txBody>
+      </p:sp>
     </p:spTree>
     <p:extLst>
       <p:ext uri="{BB962C8B-B14F-4D97-AF65-F5344CB8AC3E}">
@@ -14230,12 +14821,8 @@
           <a:p>
             <a:pPr lvl="1"/>
             <a:r>
-              <a:rPr lang="en-US"/>
-              <a:t>Non-real-time OS makes </a:t>
-            </a:r>
-            <a:r>
               <a:rPr lang="en-US" dirty="0"/>
-              <a:t>real-time programming impractical</a:t>
+              <a:t>Non-real-time OS makes real-time programming impractical</a:t>
             </a:r>
           </a:p>
           <a:p>
@@ -14263,7 +14850,7 @@
             <a:pPr lvl="1"/>
             <a:r>
               <a:rPr lang="en-US" dirty="0"/>
-              <a:t>No A/D inputs</a:t>
+              <a:t>No Analog (A/D) inputs</a:t>
             </a:r>
           </a:p>
           <a:p>
@@ -14271,6 +14858,13 @@
             <a:r>
               <a:rPr lang="en-US" dirty="0"/>
               <a:t>Narrow input voltage tolerance</a:t>
+            </a:r>
+          </a:p>
+          <a:p>
+            <a:pPr lvl="1"/>
+            <a:r>
+              <a:rPr lang="en-US" dirty="0"/>
+              <a:t>More expensive</a:t>
             </a:r>
           </a:p>
         </p:txBody>
@@ -14283,8 +14877,8 @@
         </p:nvSpPr>
         <p:spPr>
           <a:xfrm>
-            <a:off x="1472339" y="6152827"/>
-            <a:ext cx="10042902" cy="461665"/>
+            <a:off x="3011647" y="6082573"/>
+            <a:ext cx="8486815" cy="461665"/>
           </a:xfrm>
           <a:prstGeom prst="rect">
             <a:avLst/>
@@ -14301,6 +14895,65 @@
               <a:rPr lang="en-US" sz="2400" b="1" dirty="0"/>
               <a:t>Bottom Line: Choose the right tool for the job</a:t>
             </a:r>
+          </a:p>
+        </p:txBody>
+      </p:sp>
+      <p:sp>
+        <p:nvSpPr>
+          <p:cNvPr id="3" name="Footer Placeholder 2">
+            <a:extLst>
+              <a:ext uri="{FF2B5EF4-FFF2-40B4-BE49-F238E27FC236}">
+                <a16:creationId xmlns:a16="http://schemas.microsoft.com/office/drawing/2014/main" id="{DADEAE08-5C30-4988-BC51-82212638D973}"/>
+              </a:ext>
+            </a:extLst>
+          </p:cNvPr>
+          <p:cNvSpPr>
+            <a:spLocks noGrp="1"/>
+          </p:cNvSpPr>
+          <p:nvPr>
+            <p:ph type="ftr" sz="quarter" idx="11"/>
+          </p:nvPr>
+        </p:nvSpPr>
+        <p:spPr/>
+        <p:txBody>
+          <a:bodyPr/>
+          <a:lstStyle/>
+          <a:p>
+            <a:r>
+              <a:rPr lang="en-US"/>
+              <a:t>Rochester MakerSpace 2019</a:t>
+            </a:r>
+            <a:endParaRPr lang="en-US" dirty="0"/>
+          </a:p>
+        </p:txBody>
+      </p:sp>
+      <p:sp>
+        <p:nvSpPr>
+          <p:cNvPr id="7" name="Slide Number Placeholder 6">
+            <a:extLst>
+              <a:ext uri="{FF2B5EF4-FFF2-40B4-BE49-F238E27FC236}">
+                <a16:creationId xmlns:a16="http://schemas.microsoft.com/office/drawing/2014/main" id="{C7AC470B-906D-4460-960B-D4BA48604C14}"/>
+              </a:ext>
+            </a:extLst>
+          </p:cNvPr>
+          <p:cNvSpPr>
+            <a:spLocks noGrp="1"/>
+          </p:cNvSpPr>
+          <p:nvPr>
+            <p:ph type="sldNum" sz="quarter" idx="12"/>
+          </p:nvPr>
+        </p:nvSpPr>
+        <p:spPr/>
+        <p:txBody>
+          <a:bodyPr/>
+          <a:lstStyle/>
+          <a:p>
+            <a:fld id="{D57F1E4F-1CFF-5643-939E-217C01CDF565}" type="slidenum">
+              <a:rPr lang="en-US" smtClean="0"/>
+              <a:pPr/>
+              <a:t>6</a:t>
+            </a:fld>
+            <a:endParaRPr lang="en-US" dirty="0"/>
           </a:p>
         </p:txBody>
       </p:sp>
@@ -14426,6 +15079,65 @@
               <a:rPr lang="en-US" dirty="0"/>
               <a:t>Lots of examples online if you are looking for inspiration</a:t>
             </a:r>
+          </a:p>
+        </p:txBody>
+      </p:sp>
+      <p:sp>
+        <p:nvSpPr>
+          <p:cNvPr id="3" name="Footer Placeholder 2">
+            <a:extLst>
+              <a:ext uri="{FF2B5EF4-FFF2-40B4-BE49-F238E27FC236}">
+                <a16:creationId xmlns:a16="http://schemas.microsoft.com/office/drawing/2014/main" id="{06B950DD-B67F-4970-84AB-1399722E2E8B}"/>
+              </a:ext>
+            </a:extLst>
+          </p:cNvPr>
+          <p:cNvSpPr>
+            <a:spLocks noGrp="1"/>
+          </p:cNvSpPr>
+          <p:nvPr>
+            <p:ph type="ftr" sz="quarter" idx="11"/>
+          </p:nvPr>
+        </p:nvSpPr>
+        <p:spPr/>
+        <p:txBody>
+          <a:bodyPr/>
+          <a:lstStyle/>
+          <a:p>
+            <a:r>
+              <a:rPr lang="en-US"/>
+              <a:t>Rochester MakerSpace 2019</a:t>
+            </a:r>
+            <a:endParaRPr lang="en-US" dirty="0"/>
+          </a:p>
+        </p:txBody>
+      </p:sp>
+      <p:sp>
+        <p:nvSpPr>
+          <p:cNvPr id="4" name="Slide Number Placeholder 3">
+            <a:extLst>
+              <a:ext uri="{FF2B5EF4-FFF2-40B4-BE49-F238E27FC236}">
+                <a16:creationId xmlns:a16="http://schemas.microsoft.com/office/drawing/2014/main" id="{362E236B-47B4-42DA-B86C-35256B18C197}"/>
+              </a:ext>
+            </a:extLst>
+          </p:cNvPr>
+          <p:cNvSpPr>
+            <a:spLocks noGrp="1"/>
+          </p:cNvSpPr>
+          <p:nvPr>
+            <p:ph type="sldNum" sz="quarter" idx="12"/>
+          </p:nvPr>
+        </p:nvSpPr>
+        <p:spPr/>
+        <p:txBody>
+          <a:bodyPr/>
+          <a:lstStyle/>
+          <a:p>
+            <a:fld id="{D57F1E4F-1CFF-5643-939E-217C01CDF565}" type="slidenum">
+              <a:rPr lang="en-US" smtClean="0"/>
+              <a:pPr/>
+              <a:t>7</a:t>
+            </a:fld>
+            <a:endParaRPr lang="en-US" dirty="0"/>
           </a:p>
         </p:txBody>
       </p:sp>
@@ -14704,4 +15416,299 @@
     </a:ext>
   </a:extLst>
 </a:theme>
+</file>
+
+<file path=ppt/theme/theme2.xml><?xml version="1.0" encoding="utf-8"?>
+<a:theme xmlns:a="http://schemas.openxmlformats.org/drawingml/2006/main" name="Office Theme">
+  <a:themeElements>
+    <a:clrScheme name="Office">
+      <a:dk1>
+        <a:sysClr val="windowText" lastClr="000000"/>
+      </a:dk1>
+      <a:lt1>
+        <a:sysClr val="window" lastClr="FFFFFF"/>
+      </a:lt1>
+      <a:dk2>
+        <a:srgbClr val="44546A"/>
+      </a:dk2>
+      <a:lt2>
+        <a:srgbClr val="E7E6E6"/>
+      </a:lt2>
+      <a:accent1>
+        <a:srgbClr val="4472C4"/>
+      </a:accent1>
+      <a:accent2>
+        <a:srgbClr val="ED7D31"/>
+      </a:accent2>
+      <a:accent3>
+        <a:srgbClr val="A5A5A5"/>
+      </a:accent3>
+      <a:accent4>
+        <a:srgbClr val="FFC000"/>
+      </a:accent4>
+      <a:accent5>
+        <a:srgbClr val="5B9BD5"/>
+      </a:accent5>
+      <a:accent6>
+        <a:srgbClr val="70AD47"/>
+      </a:accent6>
+      <a:hlink>
+        <a:srgbClr val="0563C1"/>
+      </a:hlink>
+      <a:folHlink>
+        <a:srgbClr val="954F72"/>
+      </a:folHlink>
+    </a:clrScheme>
+    <a:fontScheme name="Office">
+      <a:majorFont>
+        <a:latin typeface="Calibri Light" panose="020F0302020204030204"/>
+        <a:ea typeface=""/>
+        <a:cs typeface=""/>
+        <a:font script="Jpan" typeface="游ゴシック Light"/>
+        <a:font script="Hang" typeface="맑은 고딕"/>
+        <a:font script="Hans" typeface="等线 Light"/>
+        <a:font script="Hant" typeface="新細明體"/>
+        <a:font script="Arab" typeface="Times New Roman"/>
+        <a:font script="Hebr" typeface="Times New Roman"/>
+        <a:font script="Thai" typeface="Angsana New"/>
+        <a:font script="Ethi" typeface="Nyala"/>
+        <a:font script="Beng" typeface="Vrinda"/>
+        <a:font script="Gujr" typeface="Shruti"/>
+        <a:font script="Khmr" typeface="MoolBoran"/>
+        <a:font script="Knda" typeface="Tunga"/>
+        <a:font script="Guru" typeface="Raavi"/>
+        <a:font script="Cans" typeface="Euphemia"/>
+        <a:font script="Cher" typeface="Plantagenet Cherokee"/>
+        <a:font script="Yiii" typeface="Microsoft Yi Baiti"/>
+        <a:font script="Tibt" typeface="Microsoft Himalaya"/>
+        <a:font script="Thaa" typeface="MV Boli"/>
+        <a:font script="Deva" typeface="Mangal"/>
+        <a:font script="Telu" typeface="Gautami"/>
+        <a:font script="Taml" typeface="Latha"/>
+        <a:font script="Syrc" typeface="Estrangelo Edessa"/>
+        <a:font script="Orya" typeface="Kalinga"/>
+        <a:font script="Mlym" typeface="Kartika"/>
+        <a:font script="Laoo" typeface="DokChampa"/>
+        <a:font script="Sinh" typeface="Iskoola Pota"/>
+        <a:font script="Mong" typeface="Mongolian Baiti"/>
+        <a:font script="Viet" typeface="Times New Roman"/>
+        <a:font script="Uigh" typeface="Microsoft Uighur"/>
+        <a:font script="Geor" typeface="Sylfaen"/>
+        <a:font script="Armn" typeface="Arial"/>
+        <a:font script="Bugi" typeface="Leelawadee UI"/>
+        <a:font script="Bopo" typeface="Microsoft JhengHei"/>
+        <a:font script="Java" typeface="Javanese Text"/>
+        <a:font script="Lisu" typeface="Segoe UI"/>
+        <a:font script="Mymr" typeface="Myanmar Text"/>
+        <a:font script="Nkoo" typeface="Ebrima"/>
+        <a:font script="Olck" typeface="Nirmala UI"/>
+        <a:font script="Osma" typeface="Ebrima"/>
+        <a:font script="Phag" typeface="Phagspa"/>
+        <a:font script="Syrn" typeface="Estrangelo Edessa"/>
+        <a:font script="Syrj" typeface="Estrangelo Edessa"/>
+        <a:font script="Syre" typeface="Estrangelo Edessa"/>
+        <a:font script="Sora" typeface="Nirmala UI"/>
+        <a:font script="Tale" typeface="Microsoft Tai Le"/>
+        <a:font script="Talu" typeface="Microsoft New Tai Lue"/>
+        <a:font script="Tfng" typeface="Ebrima"/>
+      </a:majorFont>
+      <a:minorFont>
+        <a:latin typeface="Calibri" panose="020F0502020204030204"/>
+        <a:ea typeface=""/>
+        <a:cs typeface=""/>
+        <a:font script="Jpan" typeface="游ゴシック"/>
+        <a:font script="Hang" typeface="맑은 고딕"/>
+        <a:font script="Hans" typeface="等线"/>
+        <a:font script="Hant" typeface="新細明體"/>
+        <a:font script="Arab" typeface="Arial"/>
+        <a:font script="Hebr" typeface="Arial"/>
+        <a:font script="Thai" typeface="Cordia New"/>
+        <a:font script="Ethi" typeface="Nyala"/>
+        <a:font script="Beng" typeface="Vrinda"/>
+        <a:font script="Gujr" typeface="Shruti"/>
+        <a:font script="Khmr" typeface="DaunPenh"/>
+        <a:font script="Knda" typeface="Tunga"/>
+        <a:font script="Guru" typeface="Raavi"/>
+        <a:font script="Cans" typeface="Euphemia"/>
+        <a:font script="Cher" typeface="Plantagenet Cherokee"/>
+        <a:font script="Yiii" typeface="Microsoft Yi Baiti"/>
+        <a:font script="Tibt" typeface="Microsoft Himalaya"/>
+        <a:font script="Thaa" typeface="MV Boli"/>
+        <a:font script="Deva" typeface="Mangal"/>
+        <a:font script="Telu" typeface="Gautami"/>
+        <a:font script="Taml" typeface="Latha"/>
+        <a:font script="Syrc" typeface="Estrangelo Edessa"/>
+        <a:font script="Orya" typeface="Kalinga"/>
+        <a:font script="Mlym" typeface="Kartika"/>
+        <a:font script="Laoo" typeface="DokChampa"/>
+        <a:font script="Sinh" typeface="Iskoola Pota"/>
+        <a:font script="Mong" typeface="Mongolian Baiti"/>
+        <a:font script="Viet" typeface="Arial"/>
+        <a:font script="Uigh" typeface="Microsoft Uighur"/>
+        <a:font script="Geor" typeface="Sylfaen"/>
+        <a:font script="Armn" typeface="Arial"/>
+        <a:font script="Bugi" typeface="Leelawadee UI"/>
+        <a:font script="Bopo" typeface="Microsoft JhengHei"/>
+        <a:font script="Java" typeface="Javanese Text"/>
+        <a:font script="Lisu" typeface="Segoe UI"/>
+        <a:font script="Mymr" typeface="Myanmar Text"/>
+        <a:font script="Nkoo" typeface="Ebrima"/>
+        <a:font script="Olck" typeface="Nirmala UI"/>
+        <a:font script="Osma" typeface="Ebrima"/>
+        <a:font script="Phag" typeface="Phagspa"/>
+        <a:font script="Syrn" typeface="Estrangelo Edessa"/>
+        <a:font script="Syrj" typeface="Estrangelo Edessa"/>
+        <a:font script="Syre" typeface="Estrangelo Edessa"/>
+        <a:font script="Sora" typeface="Nirmala UI"/>
+        <a:font script="Tale" typeface="Microsoft Tai Le"/>
+        <a:font script="Talu" typeface="Microsoft New Tai Lue"/>
+        <a:font script="Tfng" typeface="Ebrima"/>
+      </a:minorFont>
+    </a:fontScheme>
+    <a:fmtScheme name="Office">
+      <a:fillStyleLst>
+        <a:solidFill>
+          <a:schemeClr val="phClr"/>
+        </a:solidFill>
+        <a:gradFill rotWithShape="1">
+          <a:gsLst>
+            <a:gs pos="0">
+              <a:schemeClr val="phClr">
+                <a:lumMod val="110000"/>
+                <a:satMod val="105000"/>
+                <a:tint val="67000"/>
+              </a:schemeClr>
+            </a:gs>
+            <a:gs pos="50000">
+              <a:schemeClr val="phClr">
+                <a:lumMod val="105000"/>
+                <a:satMod val="103000"/>
+                <a:tint val="73000"/>
+              </a:schemeClr>
+            </a:gs>
+            <a:gs pos="100000">
+              <a:schemeClr val="phClr">
+                <a:lumMod val="105000"/>
+                <a:satMod val="109000"/>
+                <a:tint val="81000"/>
+              </a:schemeClr>
+            </a:gs>
+          </a:gsLst>
+          <a:lin ang="5400000" scaled="0"/>
+        </a:gradFill>
+        <a:gradFill rotWithShape="1">
+          <a:gsLst>
+            <a:gs pos="0">
+              <a:schemeClr val="phClr">
+                <a:satMod val="103000"/>
+                <a:lumMod val="102000"/>
+                <a:tint val="94000"/>
+              </a:schemeClr>
+            </a:gs>
+            <a:gs pos="50000">
+              <a:schemeClr val="phClr">
+                <a:satMod val="110000"/>
+                <a:lumMod val="100000"/>
+                <a:shade val="100000"/>
+              </a:schemeClr>
+            </a:gs>
+            <a:gs pos="100000">
+              <a:schemeClr val="phClr">
+                <a:lumMod val="99000"/>
+                <a:satMod val="120000"/>
+                <a:shade val="78000"/>
+              </a:schemeClr>
+            </a:gs>
+          </a:gsLst>
+          <a:lin ang="5400000" scaled="0"/>
+        </a:gradFill>
+      </a:fillStyleLst>
+      <a:lnStyleLst>
+        <a:ln w="6350" cap="flat" cmpd="sng" algn="ctr">
+          <a:solidFill>
+            <a:schemeClr val="phClr"/>
+          </a:solidFill>
+          <a:prstDash val="solid"/>
+          <a:miter lim="800000"/>
+        </a:ln>
+        <a:ln w="12700" cap="flat" cmpd="sng" algn="ctr">
+          <a:solidFill>
+            <a:schemeClr val="phClr"/>
+          </a:solidFill>
+          <a:prstDash val="solid"/>
+          <a:miter lim="800000"/>
+        </a:ln>
+        <a:ln w="19050" cap="flat" cmpd="sng" algn="ctr">
+          <a:solidFill>
+            <a:schemeClr val="phClr"/>
+          </a:solidFill>
+          <a:prstDash val="solid"/>
+          <a:miter lim="800000"/>
+        </a:ln>
+      </a:lnStyleLst>
+      <a:effectStyleLst>
+        <a:effectStyle>
+          <a:effectLst/>
+        </a:effectStyle>
+        <a:effectStyle>
+          <a:effectLst/>
+        </a:effectStyle>
+        <a:effectStyle>
+          <a:effectLst>
+            <a:outerShdw blurRad="57150" dist="19050" dir="5400000" algn="ctr" rotWithShape="0">
+              <a:srgbClr val="000000">
+                <a:alpha val="63000"/>
+              </a:srgbClr>
+            </a:outerShdw>
+          </a:effectLst>
+        </a:effectStyle>
+      </a:effectStyleLst>
+      <a:bgFillStyleLst>
+        <a:solidFill>
+          <a:schemeClr val="phClr"/>
+        </a:solidFill>
+        <a:solidFill>
+          <a:schemeClr val="phClr">
+            <a:tint val="95000"/>
+            <a:satMod val="170000"/>
+          </a:schemeClr>
+        </a:solidFill>
+        <a:gradFill rotWithShape="1">
+          <a:gsLst>
+            <a:gs pos="0">
+              <a:schemeClr val="phClr">
+                <a:tint val="93000"/>
+                <a:satMod val="150000"/>
+                <a:shade val="98000"/>
+                <a:lumMod val="102000"/>
+              </a:schemeClr>
+            </a:gs>
+            <a:gs pos="50000">
+              <a:schemeClr val="phClr">
+                <a:tint val="98000"/>
+                <a:satMod val="130000"/>
+                <a:shade val="90000"/>
+                <a:lumMod val="103000"/>
+              </a:schemeClr>
+            </a:gs>
+            <a:gs pos="100000">
+              <a:schemeClr val="phClr">
+                <a:shade val="63000"/>
+                <a:satMod val="120000"/>
+              </a:schemeClr>
+            </a:gs>
+          </a:gsLst>
+          <a:lin ang="5400000" scaled="0"/>
+        </a:gradFill>
+      </a:bgFillStyleLst>
+    </a:fmtScheme>
+  </a:themeElements>
+  <a:objectDefaults/>
+  <a:extraClrSchemeLst/>
+  <a:extLst>
+    <a:ext uri="{05A4C25C-085E-4340-85A3-A5531E510DB2}">
+      <thm15:themeFamily xmlns:thm15="http://schemas.microsoft.com/office/thememl/2012/main" name="Office Theme" id="{62F939B6-93AF-4DB8-9C6B-D6C7DFDC589F}" vid="{4A3C46E8-61CC-4603-A589-7422A47A8E4A}"/>
+    </a:ext>
+  </a:extLst>
+</a:theme>
 </file>
</xml_diff>